<commit_message>
Edited high logic parser diagram
</commit_message>
<xml_diff>
--- a/docs/diagrams/HighLevelLogicParser.pptx
+++ b/docs/diagrams/HighLevelLogicParser.pptx
@@ -3796,7 +3796,7 @@
           <p:spPr>
             <a:xfrm>
               <a:off x="2155159" y="3282814"/>
-              <a:ext cx="1291460" cy="441809"/>
+              <a:ext cx="1291460" cy="395369"/>
             </a:xfrm>
             <a:prstGeom prst="roundRect">
               <a:avLst>
@@ -4069,7 +4069,7 @@
             <a:p>
               <a:pPr algn="ctr"/>
               <a:r>
-                <a:rPr lang="en-US" sz="1300">
+                <a:rPr lang="en-US" sz="1300" dirty="0">
                   <a:solidFill>
                     <a:schemeClr val="tx1"/>
                   </a:solidFill>
@@ -4082,7 +4082,7 @@
             <a:p>
               <a:pPr algn="ctr"/>
               <a:r>
-                <a:rPr lang="en-US" sz="1300" err="1">
+                <a:rPr lang="en-US" sz="1300" dirty="0" err="1">
                   <a:solidFill>
                     <a:schemeClr val="tx1"/>
                   </a:solidFill>
@@ -4091,7 +4091,7 @@
                 </a:rPr>
                 <a:t>ParseExpenditure</a:t>
               </a:r>
-              <a:endParaRPr lang="en-US" sz="1300">
+              <a:endParaRPr lang="en-US" sz="1300" dirty="0">
                 <a:solidFill>
                   <a:schemeClr val="tx1"/>
                 </a:solidFill>
@@ -4357,7 +4357,7 @@
           <p:spPr>
             <a:xfrm>
               <a:off x="9654942" y="3281050"/>
-              <a:ext cx="1291460" cy="441809"/>
+              <a:ext cx="1291460" cy="397131"/>
             </a:xfrm>
             <a:prstGeom prst="roundRect">
               <a:avLst>
@@ -4395,7 +4395,7 @@
             <a:p>
               <a:pPr algn="ctr"/>
               <a:r>
-                <a:rPr lang="en-US" sz="1300">
+                <a:rPr lang="en-US" sz="1300" dirty="0">
                   <a:solidFill>
                     <a:schemeClr val="tx1"/>
                   </a:solidFill>
@@ -4405,7 +4405,7 @@
                 <a:t>{abstract}</a:t>
               </a:r>
               <a:br>
-                <a:rPr lang="en-US" sz="1300">
+                <a:rPr lang="en-US" sz="1300" dirty="0">
                   <a:solidFill>
                     <a:schemeClr val="tx1"/>
                   </a:solidFill>
@@ -4414,7 +4414,7 @@
                 </a:rPr>
               </a:br>
               <a:r>
-                <a:rPr lang="en-US" sz="1300" err="1">
+                <a:rPr lang="en-US" sz="1300" dirty="0" err="1">
                   <a:solidFill>
                     <a:schemeClr val="tx1"/>
                   </a:solidFill>
@@ -4423,7 +4423,7 @@
                 </a:rPr>
                 <a:t>ParseBond</a:t>
               </a:r>
-              <a:endParaRPr lang="en-US" sz="1300">
+              <a:endParaRPr lang="en-US" sz="1300" dirty="0">
                 <a:solidFill>
                   <a:schemeClr val="tx1"/>
                 </a:solidFill>
@@ -6205,7 +6205,7 @@
         <p:spPr>
           <a:xfrm>
             <a:off x="5110112" y="3281049"/>
-            <a:ext cx="1376485" cy="441809"/>
+            <a:ext cx="1376485" cy="397917"/>
           </a:xfrm>
           <a:prstGeom prst="roundRect">
             <a:avLst>
@@ -6273,14 +6273,146 @@
           </p:cNvPr>
           <p:cNvCxnSpPr>
             <a:cxnSpLocks/>
-            <a:endCxn id="54" idx="0"/>
           </p:cNvCxnSpPr>
           <p:nvPr/>
         </p:nvCxnSpPr>
         <p:spPr>
           <a:xfrm>
-            <a:off x="5798355" y="2269709"/>
+            <a:off x="5831529" y="2279991"/>
             <a:ext cx="0" cy="1011340"/>
+          </a:xfrm>
+          <a:prstGeom prst="line">
+            <a:avLst/>
+          </a:prstGeom>
+          <a:ln>
+            <a:solidFill>
+              <a:schemeClr val="accent2">
+                <a:lumMod val="75000"/>
+              </a:schemeClr>
+            </a:solidFill>
+            <a:headEnd type="none"/>
+            <a:tailEnd type="triangle"/>
+          </a:ln>
+        </p:spPr>
+        <p:style>
+          <a:lnRef idx="1">
+            <a:schemeClr val="accent1"/>
+          </a:lnRef>
+          <a:fillRef idx="0">
+            <a:schemeClr val="accent1"/>
+          </a:fillRef>
+          <a:effectRef idx="0">
+            <a:schemeClr val="accent1"/>
+          </a:effectRef>
+          <a:fontRef idx="minor">
+            <a:schemeClr val="tx1"/>
+          </a:fontRef>
+        </p:style>
+      </p:cxnSp>
+      <p:sp>
+        <p:nvSpPr>
+          <p:cNvPr id="56" name="Rounded Rectangle 44">
+            <a:extLst>
+              <a:ext uri="{FF2B5EF4-FFF2-40B4-BE49-F238E27FC236}">
+                <a16:creationId xmlns:a16="http://schemas.microsoft.com/office/drawing/2014/main" id="{6D97332C-2E5C-5646-9B6D-19672854F65C}"/>
+              </a:ext>
+            </a:extLst>
+          </p:cNvPr>
+          <p:cNvSpPr/>
+          <p:nvPr/>
+        </p:nvSpPr>
+        <p:spPr>
+          <a:xfrm>
+            <a:off x="6615504" y="3281049"/>
+            <a:ext cx="1291460" cy="397918"/>
+          </a:xfrm>
+          <a:prstGeom prst="roundRect">
+            <a:avLst>
+              <a:gd name="adj" fmla="val 0"/>
+            </a:avLst>
+          </a:prstGeom>
+          <a:solidFill>
+            <a:srgbClr val="FFC000"/>
+          </a:solidFill>
+          <a:ln>
+            <a:solidFill>
+              <a:srgbClr val="FFC000"/>
+            </a:solidFill>
+          </a:ln>
+        </p:spPr>
+        <p:style>
+          <a:lnRef idx="2">
+            <a:schemeClr val="accent1">
+              <a:shade val="50000"/>
+            </a:schemeClr>
+          </a:lnRef>
+          <a:fillRef idx="1">
+            <a:schemeClr val="accent1"/>
+          </a:fillRef>
+          <a:effectRef idx="0">
+            <a:schemeClr val="accent1"/>
+          </a:effectRef>
+          <a:fontRef idx="minor">
+            <a:schemeClr val="lt1"/>
+          </a:fontRef>
+        </p:style>
+        <p:txBody>
+          <a:bodyPr rtlCol="0" anchor="ctr"/>
+          <a:lstStyle/>
+          <a:p>
+            <a:pPr algn="ctr"/>
+            <a:r>
+              <a:rPr lang="en-US" sz="1300" dirty="0">
+                <a:solidFill>
+                  <a:schemeClr val="tx1"/>
+                </a:solidFill>
+                <a:latin typeface="Arial" panose="020B0604020202020204" pitchFamily="34" charset="0"/>
+                <a:cs typeface="Arial" panose="020B0604020202020204" pitchFamily="34" charset="0"/>
+              </a:rPr>
+              <a:t>{abstract}</a:t>
+            </a:r>
+          </a:p>
+          <a:p>
+            <a:pPr algn="ctr"/>
+            <a:r>
+              <a:rPr lang="en-US" sz="1300" dirty="0" err="1">
+                <a:solidFill>
+                  <a:schemeClr val="tx1"/>
+                </a:solidFill>
+                <a:latin typeface="Arial" panose="020B0604020202020204" pitchFamily="34" charset="0"/>
+                <a:cs typeface="Arial" panose="020B0604020202020204" pitchFamily="34" charset="0"/>
+              </a:rPr>
+              <a:t>ParseCardBill</a:t>
+            </a:r>
+            <a:endParaRPr lang="en-US" sz="1300" dirty="0">
+              <a:solidFill>
+                <a:schemeClr val="tx1"/>
+              </a:solidFill>
+              <a:latin typeface="Arial" panose="020B0604020202020204" pitchFamily="34" charset="0"/>
+              <a:cs typeface="Arial" panose="020B0604020202020204" pitchFamily="34" charset="0"/>
+            </a:endParaRPr>
+          </a:p>
+        </p:txBody>
+      </p:sp>
+      <p:cxnSp>
+        <p:nvCxnSpPr>
+          <p:cNvPr id="57" name="Straight Connector 56">
+            <a:extLst>
+              <a:ext uri="{FF2B5EF4-FFF2-40B4-BE49-F238E27FC236}">
+                <a16:creationId xmlns:a16="http://schemas.microsoft.com/office/drawing/2014/main" id="{42C08B15-ABEF-D948-A86D-1DFE5488B42C}"/>
+              </a:ext>
+            </a:extLst>
+          </p:cNvPr>
+          <p:cNvCxnSpPr>
+            <a:cxnSpLocks/>
+            <a:endCxn id="56" idx="0"/>
+          </p:cNvCxnSpPr>
+          <p:nvPr/>
+        </p:nvCxnSpPr>
+        <p:spPr>
+          <a:xfrm>
+            <a:off x="7261207" y="2278997"/>
+            <a:ext cx="27" cy="1002052"/>
           </a:xfrm>
           <a:prstGeom prst="line">
             <a:avLst/>

</xml_diff>